<commit_message>
update digramme de sequence
</commit_message>
<xml_diff>
--- a/Diagramme de séquence v2.pptx
+++ b/Diagramme de séquence v2.pptx
@@ -5842,6 +5842,95 @@
           </a:p>
         </p:txBody>
       </p:sp>
+      <p:sp>
+        <p:nvSpPr>
+          <p:cNvPr id="58" name="Flèche : gauche 57">
+            <a:extLst>
+              <a:ext uri="{FF2B5EF4-FFF2-40B4-BE49-F238E27FC236}">
+                <a16:creationId xmlns:a16="http://schemas.microsoft.com/office/drawing/2014/main" id="{CE73B7D6-6129-4B18-9302-B4A3EE633954}"/>
+              </a:ext>
+            </a:extLst>
+          </p:cNvPr>
+          <p:cNvSpPr/>
+          <p:nvPr/>
+        </p:nvSpPr>
+        <p:spPr>
+          <a:xfrm>
+            <a:off x="2935939" y="4766941"/>
+            <a:ext cx="1898570" cy="152785"/>
+          </a:xfrm>
+          <a:prstGeom prst="leftArrow">
+            <a:avLst/>
+          </a:prstGeom>
+          <a:solidFill>
+            <a:schemeClr val="tx1"/>
+          </a:solidFill>
+          <a:ln>
+            <a:solidFill>
+              <a:schemeClr val="tx1"/>
+            </a:solidFill>
+          </a:ln>
+        </p:spPr>
+        <p:style>
+          <a:lnRef idx="2">
+            <a:schemeClr val="accent1">
+              <a:shade val="50000"/>
+            </a:schemeClr>
+          </a:lnRef>
+          <a:fillRef idx="1">
+            <a:schemeClr val="accent1"/>
+          </a:fillRef>
+          <a:effectRef idx="0">
+            <a:schemeClr val="accent1"/>
+          </a:effectRef>
+          <a:fontRef idx="minor">
+            <a:schemeClr val="lt1"/>
+          </a:fontRef>
+        </p:style>
+        <p:txBody>
+          <a:bodyPr rtlCol="0" anchor="ctr"/>
+          <a:lstStyle/>
+          <a:p>
+            <a:pPr algn="ctr"/>
+            <a:endParaRPr lang="fr-FR"/>
+          </a:p>
+        </p:txBody>
+      </p:sp>
+      <p:sp>
+        <p:nvSpPr>
+          <p:cNvPr id="59" name="ZoneTexte 58">
+            <a:extLst>
+              <a:ext uri="{FF2B5EF4-FFF2-40B4-BE49-F238E27FC236}">
+                <a16:creationId xmlns:a16="http://schemas.microsoft.com/office/drawing/2014/main" id="{8161D42E-8CA4-48CD-A824-0469982F8F62}"/>
+              </a:ext>
+            </a:extLst>
+          </p:cNvPr>
+          <p:cNvSpPr txBox="1"/>
+          <p:nvPr/>
+        </p:nvSpPr>
+        <p:spPr>
+          <a:xfrm>
+            <a:off x="2962230" y="4516768"/>
+            <a:ext cx="1985993" cy="261610"/>
+          </a:xfrm>
+          <a:prstGeom prst="rect">
+            <a:avLst/>
+          </a:prstGeom>
+          <a:noFill/>
+        </p:spPr>
+        <p:txBody>
+          <a:bodyPr wrap="square" rtlCol="0">
+            <a:spAutoFit/>
+          </a:bodyPr>
+          <a:lstStyle/>
+          <a:p>
+            <a:r>
+              <a:rPr lang="fr-FR" sz="1100" dirty="0"/>
+              <a:t>Game over</a:t>
+            </a:r>
+          </a:p>
+        </p:txBody>
+      </p:sp>
     </p:spTree>
     <p:extLst>
       <p:ext uri="{BB962C8B-B14F-4D97-AF65-F5344CB8AC3E}">

</xml_diff>